<commit_message>
updates according to review comments
Signed-off-by: hairongchen <hairong.chen@intel.com>
</commit_message>
<xml_diff>
--- a/docs/images/ecc_components_workflow.pptx
+++ b/docs/images/ecc_components_workflow.pptx
@@ -158,6 +158,30 @@
     </pc:docChg>
   </pc:docChgLst>
   <pc:docChgLst>
+    <pc:chgData name="Chen, Hairong" userId="a9f4621c-bc2a-4414-9711-ba3c583fdc58" providerId="ADAL" clId="{2BBAE229-2B77-4E39-985B-0836EC398021}"/>
+    <pc:docChg chg="undo custSel modSld">
+      <pc:chgData name="Chen, Hairong" userId="a9f4621c-bc2a-4414-9711-ba3c583fdc58" providerId="ADAL" clId="{2BBAE229-2B77-4E39-985B-0836EC398021}" dt="2023-01-10T11:21:12.221" v="1" actId="20577"/>
+      <pc:docMkLst>
+        <pc:docMk/>
+      </pc:docMkLst>
+      <pc:sldChg chg="modSp mod">
+        <pc:chgData name="Chen, Hairong" userId="a9f4621c-bc2a-4414-9711-ba3c583fdc58" providerId="ADAL" clId="{2BBAE229-2B77-4E39-985B-0836EC398021}" dt="2023-01-10T11:21:12.221" v="1" actId="20577"/>
+        <pc:sldMkLst>
+          <pc:docMk/>
+          <pc:sldMk cId="2489578352" sldId="2147308770"/>
+        </pc:sldMkLst>
+        <pc:spChg chg="mod">
+          <ac:chgData name="Chen, Hairong" userId="a9f4621c-bc2a-4414-9711-ba3c583fdc58" providerId="ADAL" clId="{2BBAE229-2B77-4E39-985B-0836EC398021}" dt="2023-01-10T11:21:12.221" v="1" actId="20577"/>
+          <ac:spMkLst>
+            <pc:docMk/>
+            <pc:sldMk cId="2489578352" sldId="2147308770"/>
+            <ac:spMk id="109" creationId="{C1D325DE-BB2B-4666-A447-72A9FEF03078}"/>
+          </ac:spMkLst>
+        </pc:spChg>
+      </pc:sldChg>
+    </pc:docChg>
+  </pc:docChgLst>
+  <pc:docChgLst>
     <pc:chgData name="Chen, Hairong" userId="a9f4621c-bc2a-4414-9711-ba3c583fdc58" providerId="ADAL" clId="{77824198-C1F4-4C5E-BA5F-2E2D550D37E5}"/>
     <pc:docChg chg="delSld modSld">
       <pc:chgData name="Chen, Hairong" userId="a9f4621c-bc2a-4414-9711-ba3c583fdc58" providerId="ADAL" clId="{77824198-C1F4-4C5E-BA5F-2E2D550D37E5}" dt="2023-01-05T03:19:32.285" v="14" actId="20577"/>
@@ -3515,7 +3539,7 @@
           <a:p>
             <a:fld id="{1CB53107-E3FA-4F78-A72A-73688C808D87}" type="datetimeFigureOut">
               <a:rPr lang="en-US" smtClean="0"/>
-              <a:t>1/5/2023</a:t>
+              <a:t>1/10/2023</a:t>
             </a:fld>
             <a:endParaRPr lang="en-US"/>
           </a:p>
@@ -4032,7 +4056,7 @@
           <a:p>
             <a:fld id="{92CA8013-E82B-4DFC-B9B5-780FB6C3FAF6}" type="datetimeFigureOut">
               <a:rPr lang="en-US" smtClean="0"/>
-              <a:t>1/5/2023</a:t>
+              <a:t>1/10/2023</a:t>
             </a:fld>
             <a:endParaRPr lang="en-US"/>
           </a:p>
@@ -4230,7 +4254,7 @@
           <a:p>
             <a:fld id="{92CA8013-E82B-4DFC-B9B5-780FB6C3FAF6}" type="datetimeFigureOut">
               <a:rPr lang="en-US" smtClean="0"/>
-              <a:t>1/5/2023</a:t>
+              <a:t>1/10/2023</a:t>
             </a:fld>
             <a:endParaRPr lang="en-US"/>
           </a:p>
@@ -4438,7 +4462,7 @@
           <a:p>
             <a:fld id="{92CA8013-E82B-4DFC-B9B5-780FB6C3FAF6}" type="datetimeFigureOut">
               <a:rPr lang="en-US" smtClean="0"/>
-              <a:t>1/5/2023</a:t>
+              <a:t>1/10/2023</a:t>
             </a:fld>
             <a:endParaRPr lang="en-US"/>
           </a:p>
@@ -4636,7 +4660,7 @@
           <a:p>
             <a:fld id="{92CA8013-E82B-4DFC-B9B5-780FB6C3FAF6}" type="datetimeFigureOut">
               <a:rPr lang="en-US" smtClean="0"/>
-              <a:t>1/5/2023</a:t>
+              <a:t>1/10/2023</a:t>
             </a:fld>
             <a:endParaRPr lang="en-US"/>
           </a:p>
@@ -4911,7 +4935,7 @@
           <a:p>
             <a:fld id="{92CA8013-E82B-4DFC-B9B5-780FB6C3FAF6}" type="datetimeFigureOut">
               <a:rPr lang="en-US" smtClean="0"/>
-              <a:t>1/5/2023</a:t>
+              <a:t>1/10/2023</a:t>
             </a:fld>
             <a:endParaRPr lang="en-US"/>
           </a:p>
@@ -5176,7 +5200,7 @@
           <a:p>
             <a:fld id="{92CA8013-E82B-4DFC-B9B5-780FB6C3FAF6}" type="datetimeFigureOut">
               <a:rPr lang="en-US" smtClean="0"/>
-              <a:t>1/5/2023</a:t>
+              <a:t>1/10/2023</a:t>
             </a:fld>
             <a:endParaRPr lang="en-US"/>
           </a:p>
@@ -5588,7 +5612,7 @@
           <a:p>
             <a:fld id="{92CA8013-E82B-4DFC-B9B5-780FB6C3FAF6}" type="datetimeFigureOut">
               <a:rPr lang="en-US" smtClean="0"/>
-              <a:t>1/5/2023</a:t>
+              <a:t>1/10/2023</a:t>
             </a:fld>
             <a:endParaRPr lang="en-US"/>
           </a:p>
@@ -5729,7 +5753,7 @@
           <a:p>
             <a:fld id="{92CA8013-E82B-4DFC-B9B5-780FB6C3FAF6}" type="datetimeFigureOut">
               <a:rPr lang="en-US" smtClean="0"/>
-              <a:t>1/5/2023</a:t>
+              <a:t>1/10/2023</a:t>
             </a:fld>
             <a:endParaRPr lang="en-US"/>
           </a:p>
@@ -5842,7 +5866,7 @@
           <a:p>
             <a:fld id="{92CA8013-E82B-4DFC-B9B5-780FB6C3FAF6}" type="datetimeFigureOut">
               <a:rPr lang="en-US" smtClean="0"/>
-              <a:t>1/5/2023</a:t>
+              <a:t>1/10/2023</a:t>
             </a:fld>
             <a:endParaRPr lang="en-US"/>
           </a:p>
@@ -6153,7 +6177,7 @@
           <a:p>
             <a:fld id="{92CA8013-E82B-4DFC-B9B5-780FB6C3FAF6}" type="datetimeFigureOut">
               <a:rPr lang="en-US" smtClean="0"/>
-              <a:t>1/5/2023</a:t>
+              <a:t>1/10/2023</a:t>
             </a:fld>
             <a:endParaRPr lang="en-US"/>
           </a:p>
@@ -6441,7 +6465,7 @@
           <a:p>
             <a:fld id="{92CA8013-E82B-4DFC-B9B5-780FB6C3FAF6}" type="datetimeFigureOut">
               <a:rPr lang="en-US" smtClean="0"/>
-              <a:t>1/5/2023</a:t>
+              <a:t>1/10/2023</a:t>
             </a:fld>
             <a:endParaRPr lang="en-US"/>
           </a:p>
@@ -6682,7 +6706,7 @@
           <a:p>
             <a:fld id="{92CA8013-E82B-4DFC-B9B5-780FB6C3FAF6}" type="datetimeFigureOut">
               <a:rPr lang="en-US" smtClean="0"/>
-              <a:t>1/5/2023</a:t>
+              <a:t>1/10/2023</a:t>
             </a:fld>
             <a:endParaRPr lang="en-US"/>
           </a:p>

</xml_diff>